<commit_message>
kleine setup selectionActivity en EindschermActivity
</commit_message>
<xml_diff>
--- a/Drive/TussenPresentatie.pptx
+++ b/Drive/TussenPresentatie.pptx
@@ -10,6 +10,7 @@
     <p:sldId id="258" r:id="rId4"/>
     <p:sldId id="259" r:id="rId5"/>
     <p:sldId id="260" r:id="rId6"/>
+    <p:sldId id="261" r:id="rId7"/>
   </p:sldIdLst>
   <p:sldSz cx="12192000" cy="6858000"/>
   <p:notesSz cx="6858000" cy="9144000"/>
@@ -6042,7 +6043,7 @@
         <p:spPr/>
         <p:txBody>
           <a:bodyPr>
-            <a:normAutofit/>
+            <a:normAutofit fontScale="85000" lnSpcReduction="20000"/>
           </a:bodyPr>
           <a:lstStyle/>
           <a:p>
@@ -6080,8 +6081,22 @@
           <a:p>
             <a:r>
               <a:rPr lang="nl-NL" sz="3600" dirty="0" smtClean="0"/>
-              <a:t>Wat moet er nog in verwerkt worden ?</a:t>
-            </a:r>
+              <a:t>Wat moet er nog in verwerkt worden </a:t>
+            </a:r>
+            <a:r>
+              <a:rPr lang="nl-NL" sz="3600" dirty="0" smtClean="0"/>
+              <a:t>?</a:t>
+            </a:r>
+          </a:p>
+          <a:p>
+            <a:endParaRPr lang="nl-NL" sz="3600" dirty="0"/>
+          </a:p>
+          <a:p>
+            <a:r>
+              <a:rPr lang="nl-NL" sz="3600" dirty="0" smtClean="0"/>
+              <a:t>Tussen Evaluatie</a:t>
+            </a:r>
+            <a:endParaRPr lang="nl-NL" sz="3600" dirty="0" smtClean="0"/>
           </a:p>
           <a:p>
             <a:endParaRPr lang="nl-NL" sz="3600" dirty="0"/>
@@ -6328,7 +6343,7 @@
           <a:p>
             <a:r>
               <a:rPr lang="nl-NL" dirty="0" smtClean="0"/>
-              <a:t>Vraagfragmenten die type vraag aanduiden</a:t>
+              <a:t>Bezig met vraag genereren</a:t>
             </a:r>
             <a:endParaRPr lang="nl-NL" dirty="0"/>
           </a:p>
@@ -6466,6 +6481,114 @@
     <p:extLst>
       <p:ext uri="{BB962C8B-B14F-4D97-AF65-F5344CB8AC3E}">
         <p14:creationId xmlns:p14="http://schemas.microsoft.com/office/powerpoint/2010/main" val="839950418"/>
+      </p:ext>
+    </p:extLst>
+  </p:cSld>
+  <p:clrMapOvr>
+    <a:masterClrMapping/>
+  </p:clrMapOvr>
+  <p:timing>
+    <p:tnLst>
+      <p:par>
+        <p:cTn id="1" dur="indefinite" restart="never" nodeType="tmRoot"/>
+      </p:par>
+    </p:tnLst>
+  </p:timing>
+</p:sld>
+</file>
+
+<file path=ppt/slides/slide6.xml><?xml version="1.0" encoding="utf-8"?>
+<p:sld xmlns:a="http://schemas.openxmlformats.org/drawingml/2006/main" xmlns:r="http://schemas.openxmlformats.org/officeDocument/2006/relationships" xmlns:p="http://schemas.openxmlformats.org/presentationml/2006/main">
+  <p:cSld>
+    <p:spTree>
+      <p:nvGrpSpPr>
+        <p:cNvPr id="1" name=""/>
+        <p:cNvGrpSpPr/>
+        <p:nvPr/>
+      </p:nvGrpSpPr>
+      <p:grpSpPr>
+        <a:xfrm>
+          <a:off x="0" y="0"/>
+          <a:ext cx="0" cy="0"/>
+          <a:chOff x="0" y="0"/>
+          <a:chExt cx="0" cy="0"/>
+        </a:xfrm>
+      </p:grpSpPr>
+      <p:sp>
+        <p:nvSpPr>
+          <p:cNvPr id="2" name="Titel 1"/>
+          <p:cNvSpPr>
+            <a:spLocks noGrp="1"/>
+          </p:cNvSpPr>
+          <p:nvPr>
+            <p:ph type="title"/>
+          </p:nvPr>
+        </p:nvSpPr>
+        <p:spPr/>
+        <p:txBody>
+          <a:bodyPr/>
+          <a:lstStyle/>
+          <a:p>
+            <a:pPr algn="ctr"/>
+            <a:r>
+              <a:rPr lang="nl-NL" dirty="0" smtClean="0"/>
+              <a:t>Tussen Evaluatie</a:t>
+            </a:r>
+            <a:endParaRPr lang="nl-NL" dirty="0"/>
+          </a:p>
+        </p:txBody>
+      </p:sp>
+      <p:sp>
+        <p:nvSpPr>
+          <p:cNvPr id="3" name="Tijdelijke aanduiding voor inhoud 2"/>
+          <p:cNvSpPr>
+            <a:spLocks noGrp="1"/>
+          </p:cNvSpPr>
+          <p:nvPr>
+            <p:ph idx="1"/>
+          </p:nvPr>
+        </p:nvSpPr>
+        <p:spPr/>
+        <p:txBody>
+          <a:bodyPr/>
+          <a:lstStyle/>
+          <a:p>
+            <a:r>
+              <a:rPr lang="nl-NL" dirty="0"/>
+              <a:t>Minder goede communicatie in het begin</a:t>
+            </a:r>
+          </a:p>
+          <a:p>
+            <a:pPr marL="0" indent="0">
+              <a:buNone/>
+            </a:pPr>
+            <a:endParaRPr lang="nl-NL" dirty="0"/>
+          </a:p>
+          <a:p>
+            <a:r>
+              <a:rPr lang="nl-NL" dirty="0" smtClean="0"/>
+              <a:t>Wel aan deadlines gehouden</a:t>
+            </a:r>
+          </a:p>
+          <a:p>
+            <a:pPr marL="0" indent="0">
+              <a:buNone/>
+            </a:pPr>
+            <a:endParaRPr lang="nl-NL" dirty="0"/>
+          </a:p>
+          <a:p>
+            <a:r>
+              <a:rPr lang="nl-NL" dirty="0" smtClean="0"/>
+              <a:t>Verloren tijd in de kerstvakantie inhalen</a:t>
+            </a:r>
+            <a:endParaRPr lang="nl-NL" dirty="0"/>
+          </a:p>
+        </p:txBody>
+      </p:sp>
+    </p:spTree>
+    <p:extLst>
+      <p:ext uri="{BB962C8B-B14F-4D97-AF65-F5344CB8AC3E}">
+        <p14:creationId xmlns:p14="http://schemas.microsoft.com/office/powerpoint/2010/main" val="2385036491"/>
       </p:ext>
     </p:extLst>
   </p:cSld>

</xml_diff>